<commit_message>
Added our PP presentation to our file system
</commit_message>
<xml_diff>
--- a/project_one_alex_gabriel/src/main/resources/Project One Presentation.pptx
+++ b/project_one_alex_gabriel/src/main/resources/Project One Presentation.pptx
@@ -7,12 +7,16 @@
   <p:sldIdLst>
     <p:sldId id="256" r:id="rId2"/>
     <p:sldId id="266" r:id="rId3"/>
-    <p:sldId id="258" r:id="rId4"/>
-    <p:sldId id="260" r:id="rId5"/>
-    <p:sldId id="259" r:id="rId6"/>
-    <p:sldId id="267" r:id="rId7"/>
-    <p:sldId id="268" r:id="rId8"/>
-    <p:sldId id="265" r:id="rId9"/>
+    <p:sldId id="269" r:id="rId4"/>
+    <p:sldId id="258" r:id="rId5"/>
+    <p:sldId id="260" r:id="rId6"/>
+    <p:sldId id="259" r:id="rId7"/>
+    <p:sldId id="271" r:id="rId8"/>
+    <p:sldId id="270" r:id="rId9"/>
+    <p:sldId id="272" r:id="rId10"/>
+    <p:sldId id="267" r:id="rId11"/>
+    <p:sldId id="268" r:id="rId12"/>
+    <p:sldId id="265" r:id="rId13"/>
   </p:sldIdLst>
   <p:sldSz cx="12192000" cy="6858000"/>
   <p:notesSz cx="6858000" cy="9144000"/>
@@ -3726,6 +3730,252 @@
 </p:sld>
 </file>
 
+<file path=ppt/slides/slide10.xml><?xml version="1.0" encoding="utf-8"?>
+<p:sld xmlns:a="http://schemas.openxmlformats.org/drawingml/2006/main" xmlns:r="http://schemas.openxmlformats.org/officeDocument/2006/relationships" xmlns:p="http://schemas.openxmlformats.org/presentationml/2006/main">
+  <p:cSld>
+    <p:spTree>
+      <p:nvGrpSpPr>
+        <p:cNvPr id="1" name=""/>
+        <p:cNvGrpSpPr/>
+        <p:nvPr/>
+      </p:nvGrpSpPr>
+      <p:grpSpPr>
+        <a:xfrm>
+          <a:off x="0" y="0"/>
+          <a:ext cx="0" cy="0"/>
+          <a:chOff x="0" y="0"/>
+          <a:chExt cx="0" cy="0"/>
+        </a:xfrm>
+      </p:grpSpPr>
+      <p:pic>
+        <p:nvPicPr>
+          <p:cNvPr id="3" name="Picture 2">
+            <a:extLst>
+              <a:ext uri="{FF2B5EF4-FFF2-40B4-BE49-F238E27FC236}">
+                <a16:creationId xmlns:a16="http://schemas.microsoft.com/office/drawing/2014/main" id="{B0A22CA6-FB30-E14F-A65B-0E945843B42E}"/>
+              </a:ext>
+            </a:extLst>
+          </p:cNvPr>
+          <p:cNvPicPr>
+            <a:picLocks noChangeAspect="1"/>
+          </p:cNvPicPr>
+          <p:nvPr/>
+        </p:nvPicPr>
+        <p:blipFill>
+          <a:blip r:embed="rId2"/>
+          <a:stretch>
+            <a:fillRect/>
+          </a:stretch>
+        </p:blipFill>
+        <p:spPr>
+          <a:xfrm>
+            <a:off x="0" y="0"/>
+            <a:ext cx="12192000" cy="6858000"/>
+          </a:xfrm>
+          <a:prstGeom prst="rect">
+            <a:avLst/>
+          </a:prstGeom>
+        </p:spPr>
+      </p:pic>
+    </p:spTree>
+    <p:extLst>
+      <p:ext uri="{BB962C8B-B14F-4D97-AF65-F5344CB8AC3E}">
+        <p14:creationId xmlns:p14="http://schemas.microsoft.com/office/powerpoint/2010/main" val="1277288948"/>
+      </p:ext>
+    </p:extLst>
+  </p:cSld>
+  <p:clrMapOvr>
+    <a:masterClrMapping/>
+  </p:clrMapOvr>
+</p:sld>
+</file>
+
+<file path=ppt/slides/slide11.xml><?xml version="1.0" encoding="utf-8"?>
+<p:sld xmlns:a="http://schemas.openxmlformats.org/drawingml/2006/main" xmlns:r="http://schemas.openxmlformats.org/officeDocument/2006/relationships" xmlns:p="http://schemas.openxmlformats.org/presentationml/2006/main">
+  <p:cSld>
+    <p:spTree>
+      <p:nvGrpSpPr>
+        <p:cNvPr id="1" name=""/>
+        <p:cNvGrpSpPr/>
+        <p:nvPr/>
+      </p:nvGrpSpPr>
+      <p:grpSpPr>
+        <a:xfrm>
+          <a:off x="0" y="0"/>
+          <a:ext cx="0" cy="0"/>
+          <a:chOff x="0" y="0"/>
+          <a:chExt cx="0" cy="0"/>
+        </a:xfrm>
+      </p:grpSpPr>
+      <p:pic>
+        <p:nvPicPr>
+          <p:cNvPr id="3" name="Picture 2">
+            <a:extLst>
+              <a:ext uri="{FF2B5EF4-FFF2-40B4-BE49-F238E27FC236}">
+                <a16:creationId xmlns:a16="http://schemas.microsoft.com/office/drawing/2014/main" id="{DF15CE64-757B-C84F-AC82-A1C6C3B81F5E}"/>
+              </a:ext>
+            </a:extLst>
+          </p:cNvPr>
+          <p:cNvPicPr>
+            <a:picLocks noChangeAspect="1"/>
+          </p:cNvPicPr>
+          <p:nvPr/>
+        </p:nvPicPr>
+        <p:blipFill>
+          <a:blip r:embed="rId2"/>
+          <a:stretch>
+            <a:fillRect/>
+          </a:stretch>
+        </p:blipFill>
+        <p:spPr>
+          <a:xfrm>
+            <a:off x="0" y="0"/>
+            <a:ext cx="12191999" cy="6858000"/>
+          </a:xfrm>
+          <a:prstGeom prst="rect">
+            <a:avLst/>
+          </a:prstGeom>
+        </p:spPr>
+      </p:pic>
+    </p:spTree>
+    <p:extLst>
+      <p:ext uri="{BB962C8B-B14F-4D97-AF65-F5344CB8AC3E}">
+        <p14:creationId xmlns:p14="http://schemas.microsoft.com/office/powerpoint/2010/main" val="191101199"/>
+      </p:ext>
+    </p:extLst>
+  </p:cSld>
+  <p:clrMapOvr>
+    <a:masterClrMapping/>
+  </p:clrMapOvr>
+</p:sld>
+</file>
+
+<file path=ppt/slides/slide12.xml><?xml version="1.0" encoding="utf-8"?>
+<p:sld xmlns:a="http://schemas.openxmlformats.org/drawingml/2006/main" xmlns:r="http://schemas.openxmlformats.org/officeDocument/2006/relationships" xmlns:p="http://schemas.openxmlformats.org/presentationml/2006/main">
+  <p:cSld>
+    <p:spTree>
+      <p:nvGrpSpPr>
+        <p:cNvPr id="1" name=""/>
+        <p:cNvGrpSpPr/>
+        <p:nvPr/>
+      </p:nvGrpSpPr>
+      <p:grpSpPr>
+        <a:xfrm>
+          <a:off x="0" y="0"/>
+          <a:ext cx="0" cy="0"/>
+          <a:chOff x="0" y="0"/>
+          <a:chExt cx="0" cy="0"/>
+        </a:xfrm>
+      </p:grpSpPr>
+      <p:sp>
+        <p:nvSpPr>
+          <p:cNvPr id="2" name="Title 1">
+            <a:extLst>
+              <a:ext uri="{FF2B5EF4-FFF2-40B4-BE49-F238E27FC236}">
+                <a16:creationId xmlns:a16="http://schemas.microsoft.com/office/drawing/2014/main" id="{D8BC650F-C586-7044-AD83-FB91A768494F}"/>
+              </a:ext>
+            </a:extLst>
+          </p:cNvPr>
+          <p:cNvSpPr>
+            <a:spLocks noGrp="1"/>
+          </p:cNvSpPr>
+          <p:nvPr>
+            <p:ph type="ctrTitle"/>
+          </p:nvPr>
+        </p:nvSpPr>
+        <p:spPr>
+          <a:xfrm>
+            <a:off x="2417779" y="802298"/>
+            <a:ext cx="8637073" cy="2541431"/>
+          </a:xfrm>
+        </p:spPr>
+        <p:txBody>
+          <a:bodyPr>
+            <a:normAutofit fontScale="90000"/>
+          </a:bodyPr>
+          <a:lstStyle/>
+          <a:p>
+            <a:r>
+              <a:rPr lang="en-US" sz="3200" dirty="0"/>
+              <a:t>Thank you for your time!</a:t>
+            </a:r>
+            <a:br>
+              <a:rPr lang="en-US" sz="3200" dirty="0"/>
+            </a:br>
+            <a:r>
+              <a:rPr lang="en-US" sz="3200" dirty="0"/>
+              <a:t>Any Questions?</a:t>
+            </a:r>
+            <a:br>
+              <a:rPr lang="en-US" sz="3200" dirty="0"/>
+            </a:br>
+            <a:br>
+              <a:rPr lang="en-US" sz="4000" dirty="0"/>
+            </a:br>
+            <a:br>
+              <a:rPr lang="en-US" sz="4000" dirty="0"/>
+            </a:br>
+            <a:r>
+              <a:rPr lang="en-US" sz="6000" dirty="0"/>
+              <a:t>AGILERS</a:t>
+            </a:r>
+          </a:p>
+        </p:txBody>
+      </p:sp>
+      <p:sp>
+        <p:nvSpPr>
+          <p:cNvPr id="3" name="Subtitle 2">
+            <a:extLst>
+              <a:ext uri="{FF2B5EF4-FFF2-40B4-BE49-F238E27FC236}">
+                <a16:creationId xmlns:a16="http://schemas.microsoft.com/office/drawing/2014/main" id="{D0313645-FE71-914D-8C3B-4B493021A538}"/>
+              </a:ext>
+            </a:extLst>
+          </p:cNvPr>
+          <p:cNvSpPr>
+            <a:spLocks noGrp="1"/>
+          </p:cNvSpPr>
+          <p:nvPr>
+            <p:ph type="subTitle" idx="1"/>
+          </p:nvPr>
+        </p:nvSpPr>
+        <p:spPr>
+          <a:xfrm>
+            <a:off x="2417780" y="3531203"/>
+            <a:ext cx="8637072" cy="1723969"/>
+          </a:xfrm>
+        </p:spPr>
+        <p:txBody>
+          <a:bodyPr>
+            <a:normAutofit fontScale="62500" lnSpcReduction="20000"/>
+          </a:bodyPr>
+          <a:lstStyle/>
+          <a:p>
+            <a:endParaRPr lang="en-US" sz="7200" dirty="0"/>
+          </a:p>
+          <a:p>
+            <a:endParaRPr lang="en-US" dirty="0"/>
+          </a:p>
+          <a:p>
+            <a:r>
+              <a:rPr lang="en-US" sz="3200" dirty="0"/>
+              <a:t>Engineered By Alex Johnson AND GABRIEL ZAPATA</a:t>
+            </a:r>
+          </a:p>
+        </p:txBody>
+      </p:sp>
+    </p:spTree>
+    <p:extLst>
+      <p:ext uri="{BB962C8B-B14F-4D97-AF65-F5344CB8AC3E}">
+        <p14:creationId xmlns:p14="http://schemas.microsoft.com/office/powerpoint/2010/main" val="86170640"/>
+      </p:ext>
+    </p:extLst>
+  </p:cSld>
+  <p:clrMapOvr>
+    <a:masterClrMapping/>
+  </p:clrMapOvr>
+</p:sld>
+</file>
+
 <file path=ppt/slides/slide2.xml><?xml version="1.0" encoding="utf-8"?>
 <p:sld xmlns:a="http://schemas.openxmlformats.org/drawingml/2006/main" xmlns:r="http://schemas.openxmlformats.org/officeDocument/2006/relationships" xmlns:p="http://schemas.openxmlformats.org/presentationml/2006/main">
   <p:cSld>
@@ -3766,7 +4016,7 @@
           <a:p>
             <a:r>
               <a:rPr lang="en-US" dirty="0"/>
-              <a:t>Target Market</a:t>
+              <a:t>User Stories</a:t>
             </a:r>
           </a:p>
         </p:txBody>
@@ -3790,73 +4040,120 @@
         <p:spPr>
           <a:xfrm>
             <a:off x="1447330" y="2010878"/>
-            <a:ext cx="4836511" cy="3448595"/>
-          </a:xfrm>
-        </p:spPr>
-        <p:txBody>
-          <a:bodyPr/>
-          <a:lstStyle/>
-          <a:p>
-            <a:r>
-              <a:rPr lang="en-US" dirty="0" err="1"/>
-              <a:t>Revature</a:t>
-            </a:r>
+            <a:ext cx="4836511" cy="4043558"/>
+          </a:xfrm>
+        </p:spPr>
+        <p:txBody>
+          <a:bodyPr>
+            <a:normAutofit/>
+          </a:bodyPr>
+          <a:lstStyle/>
+          <a:p>
+            <a:r>
+              <a:rPr lang="en-US" dirty="0"/>
+              <a:t>Login</a:t>
+            </a:r>
+          </a:p>
+          <a:p>
+            <a:r>
+              <a:rPr lang="en-US" dirty="0"/>
+              <a:t>Register</a:t>
+            </a:r>
+          </a:p>
+          <a:p>
+            <a:r>
+              <a:rPr lang="en-US" dirty="0"/>
+              <a:t> Employee: </a:t>
+            </a:r>
+          </a:p>
+          <a:p>
+            <a:pPr lvl="1"/>
+            <a:r>
+              <a:rPr lang="en-US" dirty="0"/>
+              <a:t>View their reimbursement requests</a:t>
+            </a:r>
+          </a:p>
+          <a:p>
+            <a:pPr lvl="1"/>
+            <a:r>
+              <a:rPr lang="en-US" dirty="0"/>
+              <a:t>Submit new request</a:t>
+            </a:r>
+          </a:p>
+          <a:p>
+            <a:pPr lvl="1"/>
             <a:endParaRPr lang="en-US" dirty="0"/>
           </a:p>
           <a:p>
-            <a:r>
-              <a:rPr lang="en-US" dirty="0"/>
-              <a:t>and </a:t>
-            </a:r>
-            <a:r>
-              <a:rPr lang="en-US" dirty="0" err="1"/>
-              <a:t>Revature</a:t>
-            </a:r>
-            <a:r>
-              <a:rPr lang="en-US" dirty="0"/>
-              <a:t> ONLY</a:t>
-            </a:r>
-          </a:p>
-          <a:p>
-            <a:r>
-              <a:rPr lang="en-US" dirty="0"/>
-              <a:t> Adopt us over your current ERS solution!</a:t>
-            </a:r>
-          </a:p>
-          <a:p>
+            <a:pPr lvl="1"/>
             <a:endParaRPr lang="en-US" dirty="0"/>
           </a:p>
-        </p:txBody>
-      </p:sp>
-      <p:pic>
-        <p:nvPicPr>
-          <p:cNvPr id="8" name="Content Placeholder 7">
+          <a:p>
+            <a:endParaRPr lang="en-US" dirty="0"/>
+          </a:p>
+        </p:txBody>
+      </p:sp>
+      <p:sp>
+        <p:nvSpPr>
+          <p:cNvPr id="10" name="Content Placeholder 9">
             <a:extLst>
               <a:ext uri="{FF2B5EF4-FFF2-40B4-BE49-F238E27FC236}">
-                <a16:creationId xmlns:a16="http://schemas.microsoft.com/office/drawing/2014/main" id="{32D5054F-14E5-B047-92C4-CD099ABF46A7}"/>
+                <a16:creationId xmlns:a16="http://schemas.microsoft.com/office/drawing/2014/main" id="{0D66FF15-706E-C248-B1B0-490C5570C8DF}"/>
               </a:ext>
             </a:extLst>
           </p:cNvPr>
-          <p:cNvPicPr>
-            <a:picLocks noGrp="1" noChangeAspect="1"/>
-          </p:cNvPicPr>
+          <p:cNvSpPr>
+            <a:spLocks noGrp="1"/>
+          </p:cNvSpPr>
           <p:nvPr>
             <p:ph sz="half" idx="2"/>
           </p:nvPr>
-        </p:nvPicPr>
-        <p:blipFill>
-          <a:blip r:embed="rId2"/>
-          <a:stretch>
-            <a:fillRect/>
-          </a:stretch>
-        </p:blipFill>
-        <p:spPr>
-          <a:xfrm>
-            <a:off x="6952008" y="2010877"/>
-            <a:ext cx="4102843" cy="4102843"/>
-          </a:xfrm>
-        </p:spPr>
-      </p:pic>
+        </p:nvSpPr>
+        <p:spPr/>
+        <p:txBody>
+          <a:bodyPr>
+            <a:normAutofit/>
+          </a:bodyPr>
+          <a:lstStyle/>
+          <a:p>
+            <a:r>
+              <a:rPr lang="en-US" dirty="0"/>
+              <a:t>Manager: </a:t>
+            </a:r>
+          </a:p>
+          <a:p>
+            <a:pPr lvl="1"/>
+            <a:r>
+              <a:rPr lang="en-US" dirty="0"/>
+              <a:t>View all employee requests</a:t>
+            </a:r>
+          </a:p>
+          <a:p>
+            <a:pPr lvl="1"/>
+            <a:r>
+              <a:rPr lang="en-US" dirty="0"/>
+              <a:t>Submit new request</a:t>
+            </a:r>
+          </a:p>
+          <a:p>
+            <a:pPr lvl="1"/>
+            <a:r>
+              <a:rPr lang="en-US" dirty="0"/>
+              <a:t>Approve/deny requests</a:t>
+            </a:r>
+          </a:p>
+          <a:p>
+            <a:pPr lvl="1"/>
+            <a:r>
+              <a:rPr lang="en-US" dirty="0"/>
+              <a:t>Filter requests by status</a:t>
+            </a:r>
+          </a:p>
+          <a:p>
+            <a:endParaRPr lang="en-US" dirty="0"/>
+          </a:p>
+        </p:txBody>
+      </p:sp>
     </p:spTree>
     <p:extLst>
       <p:ext uri="{BB962C8B-B14F-4D97-AF65-F5344CB8AC3E}">
@@ -3910,15 +4207,7 @@
           <a:p>
             <a:r>
               <a:rPr lang="en-US" dirty="0"/>
-              <a:t>Why </a:t>
-            </a:r>
-            <a:r>
-              <a:rPr lang="en-US" dirty="0" err="1"/>
-              <a:t>Agilers</a:t>
-            </a:r>
-            <a:r>
-              <a:rPr lang="en-US" dirty="0"/>
-              <a:t>?</a:t>
+              <a:t>Target Market</a:t>
             </a:r>
           </a:p>
         </p:txBody>
@@ -3941,53 +4230,38 @@
         </p:nvSpPr>
         <p:spPr>
           <a:xfrm>
-            <a:off x="1447331" y="2010878"/>
-            <a:ext cx="3741358" cy="3448595"/>
-          </a:xfrm>
-        </p:spPr>
-        <p:txBody>
-          <a:bodyPr/>
-          <a:lstStyle/>
-          <a:p>
-            <a:r>
-              <a:rPr lang="en-US" dirty="0"/>
-              <a:t>Most efficient</a:t>
-            </a:r>
-          </a:p>
-          <a:p>
-            <a:r>
-              <a:rPr lang="en-US" dirty="0"/>
-              <a:t>Most </a:t>
-            </a:r>
-            <a:r>
-              <a:rPr lang="en-US" u="sng" dirty="0"/>
-              <a:t>aesthetically pleasing </a:t>
-            </a:r>
-            <a:r>
-              <a:rPr lang="en-US" dirty="0"/>
-              <a:t>layout and design</a:t>
-            </a:r>
-          </a:p>
-          <a:p>
-            <a:r>
-              <a:rPr lang="en-US" dirty="0"/>
-              <a:t>The </a:t>
-            </a:r>
+            <a:off x="1447330" y="2010878"/>
+            <a:ext cx="4836511" cy="3448595"/>
+          </a:xfrm>
+        </p:spPr>
+        <p:txBody>
+          <a:bodyPr/>
+          <a:lstStyle/>
+          <a:p>
             <a:r>
               <a:rPr lang="en-US" dirty="0" err="1"/>
-              <a:t>illest</a:t>
-            </a:r>
-            <a:r>
-              <a:rPr lang="en-US" dirty="0"/>
-              <a:t>, </a:t>
+              <a:t>Revature</a:t>
+            </a:r>
+            <a:endParaRPr lang="en-US" dirty="0"/>
+          </a:p>
+          <a:p>
+            <a:r>
+              <a:rPr lang="en-US" dirty="0"/>
+              <a:t>and </a:t>
             </a:r>
             <a:r>
               <a:rPr lang="en-US" dirty="0" err="1"/>
-              <a:t>leetest</a:t>
-            </a:r>
-            <a:r>
-              <a:rPr lang="en-US" dirty="0"/>
-              <a:t> ERS solution on the market</a:t>
+              <a:t>Revature</a:t>
+            </a:r>
+            <a:r>
+              <a:rPr lang="en-US" dirty="0"/>
+              <a:t> ONLY</a:t>
+            </a:r>
+          </a:p>
+          <a:p>
+            <a:r>
+              <a:rPr lang="en-US" dirty="0"/>
+              <a:t> Adopt us over your current ERS solution!</a:t>
             </a:r>
           </a:p>
           <a:p>
@@ -4000,7 +4274,7 @@
           <p:cNvPr id="8" name="Content Placeholder 7">
             <a:extLst>
               <a:ext uri="{FF2B5EF4-FFF2-40B4-BE49-F238E27FC236}">
-                <a16:creationId xmlns:a16="http://schemas.microsoft.com/office/drawing/2014/main" id="{26183DF9-22BB-8346-B373-BF7055972CB1}"/>
+                <a16:creationId xmlns:a16="http://schemas.microsoft.com/office/drawing/2014/main" id="{32D5054F-14E5-B047-92C4-CD099ABF46A7}"/>
               </a:ext>
             </a:extLst>
           </p:cNvPr>
@@ -4019,15 +4293,15 @@
         </p:blipFill>
         <p:spPr>
           <a:xfrm>
-            <a:off x="5168175" y="2010877"/>
-            <a:ext cx="5890351" cy="3448595"/>
+            <a:off x="6952008" y="2010877"/>
+            <a:ext cx="4102843" cy="4102843"/>
           </a:xfrm>
         </p:spPr>
       </p:pic>
     </p:spTree>
     <p:extLst>
       <p:ext uri="{BB962C8B-B14F-4D97-AF65-F5344CB8AC3E}">
-        <p14:creationId xmlns:p14="http://schemas.microsoft.com/office/powerpoint/2010/main" val="2632770630"/>
+        <p14:creationId xmlns:p14="http://schemas.microsoft.com/office/powerpoint/2010/main" val="675067019"/>
       </p:ext>
     </p:extLst>
   </p:cSld>
@@ -4059,7 +4333,7 @@
           <p:cNvPr id="2" name="Title 1">
             <a:extLst>
               <a:ext uri="{FF2B5EF4-FFF2-40B4-BE49-F238E27FC236}">
-                <a16:creationId xmlns:a16="http://schemas.microsoft.com/office/drawing/2014/main" id="{7BEC23B3-E2CF-CA42-BC1F-2F9E57DA4F30}"/>
+                <a16:creationId xmlns:a16="http://schemas.microsoft.com/office/drawing/2014/main" id="{49345393-DEA1-BE41-9AD4-59CDD516CE8E}"/>
               </a:ext>
             </a:extLst>
           </p:cNvPr>
@@ -4077,24 +4351,106 @@
           <a:p>
             <a:r>
               <a:rPr lang="en-US" dirty="0"/>
-              <a:t>Now For A Site Demonstration…</a:t>
-            </a:r>
+              <a:t>Why </a:t>
+            </a:r>
+            <a:r>
+              <a:rPr lang="en-US" dirty="0" err="1"/>
+              <a:t>Agilers</a:t>
+            </a:r>
+            <a:r>
+              <a:rPr lang="en-US" dirty="0"/>
+              <a:t>?</a:t>
+            </a:r>
+          </a:p>
+        </p:txBody>
+      </p:sp>
+      <p:sp>
+        <p:nvSpPr>
+          <p:cNvPr id="3" name="Content Placeholder 2">
+            <a:extLst>
+              <a:ext uri="{FF2B5EF4-FFF2-40B4-BE49-F238E27FC236}">
+                <a16:creationId xmlns:a16="http://schemas.microsoft.com/office/drawing/2014/main" id="{401F05B3-08F7-424D-BF70-E1DA631B6938}"/>
+              </a:ext>
+            </a:extLst>
+          </p:cNvPr>
+          <p:cNvSpPr>
+            <a:spLocks noGrp="1"/>
+          </p:cNvSpPr>
+          <p:nvPr>
+            <p:ph sz="half" idx="1"/>
+          </p:nvPr>
+        </p:nvSpPr>
+        <p:spPr>
+          <a:xfrm>
+            <a:off x="1447331" y="2010878"/>
+            <a:ext cx="3741358" cy="3448595"/>
+          </a:xfrm>
+        </p:spPr>
+        <p:txBody>
+          <a:bodyPr/>
+          <a:lstStyle/>
+          <a:p>
+            <a:r>
+              <a:rPr lang="en-US" dirty="0"/>
+              <a:t>Most efficient</a:t>
+            </a:r>
+          </a:p>
+          <a:p>
+            <a:r>
+              <a:rPr lang="en-US" dirty="0"/>
+              <a:t>Most </a:t>
+            </a:r>
+            <a:r>
+              <a:rPr lang="en-US" u="sng" dirty="0"/>
+              <a:t>aesthetically pleasing </a:t>
+            </a:r>
+            <a:r>
+              <a:rPr lang="en-US" dirty="0"/>
+              <a:t>layout and design</a:t>
+            </a:r>
+          </a:p>
+          <a:p>
+            <a:r>
+              <a:rPr lang="en-US" dirty="0"/>
+              <a:t>The </a:t>
+            </a:r>
+            <a:r>
+              <a:rPr lang="en-US" dirty="0" err="1"/>
+              <a:t>illest</a:t>
+            </a:r>
+            <a:r>
+              <a:rPr lang="en-US" dirty="0"/>
+              <a:t>, </a:t>
+            </a:r>
+            <a:r>
+              <a:rPr lang="en-US" dirty="0" err="1"/>
+              <a:t>leetest</a:t>
+            </a:r>
+            <a:r>
+              <a:rPr lang="en-US" dirty="0"/>
+              <a:t> ERS solution on the market</a:t>
+            </a:r>
+          </a:p>
+          <a:p>
+            <a:endParaRPr lang="en-US" dirty="0"/>
           </a:p>
         </p:txBody>
       </p:sp>
       <p:pic>
         <p:nvPicPr>
-          <p:cNvPr id="5" name="Picture 4">
+          <p:cNvPr id="8" name="Content Placeholder 7">
             <a:extLst>
               <a:ext uri="{FF2B5EF4-FFF2-40B4-BE49-F238E27FC236}">
-                <a16:creationId xmlns:a16="http://schemas.microsoft.com/office/drawing/2014/main" id="{D22EB2B7-BE58-274B-B3E7-D5211D4541D3}"/>
+                <a16:creationId xmlns:a16="http://schemas.microsoft.com/office/drawing/2014/main" id="{26183DF9-22BB-8346-B373-BF7055972CB1}"/>
               </a:ext>
             </a:extLst>
           </p:cNvPr>
           <p:cNvPicPr>
-            <a:picLocks noChangeAspect="1"/>
+            <a:picLocks noGrp="1" noChangeAspect="1"/>
           </p:cNvPicPr>
-          <p:nvPr/>
+          <p:nvPr>
+            <p:ph sz="half" idx="2"/>
+          </p:nvPr>
         </p:nvPicPr>
         <p:blipFill>
           <a:blip r:embed="rId2"/>
@@ -4104,18 +4460,15 @@
         </p:blipFill>
         <p:spPr>
           <a:xfrm>
-            <a:off x="2847137" y="1935126"/>
-            <a:ext cx="6816000" cy="4178595"/>
-          </a:xfrm>
-          <a:prstGeom prst="rect">
-            <a:avLst/>
-          </a:prstGeom>
+            <a:off x="5168175" y="2010877"/>
+            <a:ext cx="5890351" cy="3448595"/>
+          </a:xfrm>
         </p:spPr>
       </p:pic>
     </p:spTree>
     <p:extLst>
       <p:ext uri="{BB962C8B-B14F-4D97-AF65-F5344CB8AC3E}">
-        <p14:creationId xmlns:p14="http://schemas.microsoft.com/office/powerpoint/2010/main" val="1213075969"/>
+        <p14:creationId xmlns:p14="http://schemas.microsoft.com/office/powerpoint/2010/main" val="2632770630"/>
       </p:ext>
     </p:extLst>
   </p:cSld>
@@ -4147,7 +4500,7 @@
           <p:cNvPr id="2" name="Title 1">
             <a:extLst>
               <a:ext uri="{FF2B5EF4-FFF2-40B4-BE49-F238E27FC236}">
-                <a16:creationId xmlns:a16="http://schemas.microsoft.com/office/drawing/2014/main" id="{91AC6E37-E50E-7447-8EF1-72790B441D83}"/>
+                <a16:creationId xmlns:a16="http://schemas.microsoft.com/office/drawing/2014/main" id="{7BEC23B3-E2CF-CA42-BC1F-2F9E57DA4F30}"/>
               </a:ext>
             </a:extLst>
           </p:cNvPr>
@@ -4165,83 +4518,24 @@
           <a:p>
             <a:r>
               <a:rPr lang="en-US" dirty="0"/>
-              <a:t>Sample Code</a:t>
-            </a:r>
-          </a:p>
-        </p:txBody>
-      </p:sp>
-      <p:sp>
-        <p:nvSpPr>
-          <p:cNvPr id="4" name="Content Placeholder 3">
+              <a:t>Now For A Site Demonstration…</a:t>
+            </a:r>
+          </a:p>
+        </p:txBody>
+      </p:sp>
+      <p:pic>
+        <p:nvPicPr>
+          <p:cNvPr id="5" name="Picture 4">
             <a:extLst>
               <a:ext uri="{FF2B5EF4-FFF2-40B4-BE49-F238E27FC236}">
-                <a16:creationId xmlns:a16="http://schemas.microsoft.com/office/drawing/2014/main" id="{EFF43386-633B-BE4E-9503-18B0D7E6F1AD}"/>
-              </a:ext>
-            </a:extLst>
-          </p:cNvPr>
-          <p:cNvSpPr>
-            <a:spLocks noGrp="1"/>
-          </p:cNvSpPr>
-          <p:nvPr>
-            <p:ph sz="half" idx="2"/>
-          </p:nvPr>
-        </p:nvSpPr>
-        <p:spPr/>
-        <p:txBody>
-          <a:bodyPr/>
-          <a:lstStyle/>
-          <a:p>
-            <a:r>
-              <a:rPr lang="en-US" dirty="0"/>
-              <a:t>Store entered username when login button clicked</a:t>
-            </a:r>
-          </a:p>
-          <a:p>
-            <a:pPr lvl="1"/>
-            <a:r>
-              <a:rPr lang="en-US" dirty="0"/>
-              <a:t>1st argument: given item name</a:t>
-            </a:r>
-          </a:p>
-          <a:p>
-            <a:pPr lvl="1"/>
-            <a:r>
-              <a:rPr lang="en-US" dirty="0"/>
-              <a:t>2</a:t>
-            </a:r>
-            <a:r>
-              <a:rPr lang="en-US" baseline="30000" dirty="0"/>
-              <a:t>nd</a:t>
-            </a:r>
-            <a:r>
-              <a:rPr lang="en-US" dirty="0"/>
-              <a:t> argument: item to target</a:t>
-            </a:r>
-          </a:p>
-          <a:p>
-            <a:pPr lvl="1"/>
-            <a:r>
-              <a:rPr lang="en-US" dirty="0"/>
-              <a:t>Saves to window’s local storage</a:t>
-            </a:r>
-          </a:p>
-        </p:txBody>
-      </p:sp>
-      <p:pic>
-        <p:nvPicPr>
-          <p:cNvPr id="14" name="Content Placeholder 13">
-            <a:extLst>
-              <a:ext uri="{FF2B5EF4-FFF2-40B4-BE49-F238E27FC236}">
-                <a16:creationId xmlns:a16="http://schemas.microsoft.com/office/drawing/2014/main" id="{45C212AE-D513-A04A-B58D-440E147BFBB1}"/>
+                <a16:creationId xmlns:a16="http://schemas.microsoft.com/office/drawing/2014/main" id="{D22EB2B7-BE58-274B-B3E7-D5211D4541D3}"/>
               </a:ext>
             </a:extLst>
           </p:cNvPr>
           <p:cNvPicPr>
-            <a:picLocks noGrp="1" noChangeAspect="1"/>
+            <a:picLocks noChangeAspect="1"/>
           </p:cNvPicPr>
-          <p:nvPr>
-            <p:ph sz="half" idx="1"/>
-          </p:nvPr>
+          <p:nvPr/>
         </p:nvPicPr>
         <p:blipFill>
           <a:blip r:embed="rId2"/>
@@ -4251,50 +4545,18 @@
         </p:blipFill>
         <p:spPr>
           <a:xfrm>
-            <a:off x="147102" y="2017343"/>
-            <a:ext cx="6266669" cy="809941"/>
-          </a:xfrm>
-        </p:spPr>
-      </p:pic>
-      <p:sp>
-        <p:nvSpPr>
-          <p:cNvPr id="20" name="TextBox 19">
-            <a:extLst>
-              <a:ext uri="{FF2B5EF4-FFF2-40B4-BE49-F238E27FC236}">
-                <a16:creationId xmlns:a16="http://schemas.microsoft.com/office/drawing/2014/main" id="{745168A5-626E-9142-A5DE-84D27A35C99A}"/>
-              </a:ext>
-            </a:extLst>
-          </p:cNvPr>
-          <p:cNvSpPr txBox="1"/>
-          <p:nvPr/>
-        </p:nvSpPr>
-        <p:spPr>
-          <a:xfrm>
-            <a:off x="715108" y="2977662"/>
-            <a:ext cx="5169877" cy="369332"/>
+            <a:off x="2847137" y="1935126"/>
+            <a:ext cx="6816000" cy="4178595"/>
           </a:xfrm>
           <a:prstGeom prst="rect">
             <a:avLst/>
           </a:prstGeom>
-          <a:noFill/>
-        </p:spPr>
-        <p:txBody>
-          <a:bodyPr wrap="square" rtlCol="0">
-            <a:spAutoFit/>
-          </a:bodyPr>
-          <a:lstStyle/>
-          <a:p>
-            <a:r>
-              <a:rPr lang="en-US" dirty="0"/>
-              <a:t>Context: within function triggered by click event</a:t>
-            </a:r>
-          </a:p>
-        </p:txBody>
-      </p:sp>
+        </p:spPr>
+      </p:pic>
     </p:spTree>
     <p:extLst>
       <p:ext uri="{BB962C8B-B14F-4D97-AF65-F5344CB8AC3E}">
-        <p14:creationId xmlns:p14="http://schemas.microsoft.com/office/powerpoint/2010/main" val="1590656834"/>
+        <p14:creationId xmlns:p14="http://schemas.microsoft.com/office/powerpoint/2010/main" val="1213075969"/>
       </p:ext>
     </p:extLst>
   </p:cSld>
@@ -4321,10 +4583,138 @@
           <a:chExt cx="0" cy="0"/>
         </a:xfrm>
       </p:grpSpPr>
+      <p:sp>
+        <p:nvSpPr>
+          <p:cNvPr id="2" name="Title 1">
+            <a:extLst>
+              <a:ext uri="{FF2B5EF4-FFF2-40B4-BE49-F238E27FC236}">
+                <a16:creationId xmlns:a16="http://schemas.microsoft.com/office/drawing/2014/main" id="{91AC6E37-E50E-7447-8EF1-72790B441D83}"/>
+              </a:ext>
+            </a:extLst>
+          </p:cNvPr>
+          <p:cNvSpPr>
+            <a:spLocks noGrp="1"/>
+          </p:cNvSpPr>
+          <p:nvPr>
+            <p:ph type="title"/>
+          </p:nvPr>
+        </p:nvSpPr>
+        <p:spPr/>
+        <p:txBody>
+          <a:bodyPr/>
+          <a:lstStyle/>
+          <a:p>
+            <a:r>
+              <a:rPr lang="en-US" dirty="0"/>
+              <a:t>Sample Code: </a:t>
+            </a:r>
+            <a:br>
+              <a:rPr lang="en-US" dirty="0"/>
+            </a:br>
+            <a:r>
+              <a:rPr lang="en-US" dirty="0"/>
+              <a:t>Check For Duplicate Username</a:t>
+            </a:r>
+          </a:p>
+        </p:txBody>
+      </p:sp>
+      <p:sp>
+        <p:nvSpPr>
+          <p:cNvPr id="4" name="Content Placeholder 3">
+            <a:extLst>
+              <a:ext uri="{FF2B5EF4-FFF2-40B4-BE49-F238E27FC236}">
+                <a16:creationId xmlns:a16="http://schemas.microsoft.com/office/drawing/2014/main" id="{EFF43386-633B-BE4E-9503-18B0D7E6F1AD}"/>
+              </a:ext>
+            </a:extLst>
+          </p:cNvPr>
+          <p:cNvSpPr>
+            <a:spLocks noGrp="1"/>
+          </p:cNvSpPr>
+          <p:nvPr>
+            <p:ph sz="half" idx="2"/>
+          </p:nvPr>
+        </p:nvSpPr>
+        <p:spPr/>
+        <p:txBody>
+          <a:bodyPr/>
+          <a:lstStyle/>
+          <a:p>
+            <a:r>
+              <a:rPr lang="en-US" dirty="0"/>
+              <a:t>Context: in </a:t>
+            </a:r>
+            <a:r>
+              <a:rPr lang="en-US" dirty="0" err="1"/>
+              <a:t>async</a:t>
+            </a:r>
+            <a:r>
+              <a:rPr lang="en-US" dirty="0"/>
+              <a:t> function register()</a:t>
+            </a:r>
+          </a:p>
+          <a:p>
+            <a:r>
+              <a:rPr lang="en-US" dirty="0" err="1"/>
+              <a:t>newUser</a:t>
+            </a:r>
+            <a:r>
+              <a:rPr lang="en-US" dirty="0"/>
+              <a:t> has been built using user registration input</a:t>
+            </a:r>
+          </a:p>
+          <a:p>
+            <a:r>
+              <a:rPr lang="en-US" dirty="0"/>
+              <a:t>Attempt to add </a:t>
+            </a:r>
+            <a:r>
+              <a:rPr lang="en-US" dirty="0" err="1"/>
+              <a:t>newUser</a:t>
+            </a:r>
+            <a:r>
+              <a:rPr lang="en-US" dirty="0"/>
+              <a:t> to DB using a POST request </a:t>
+            </a:r>
+          </a:p>
+          <a:p>
+            <a:endParaRPr lang="en-US" dirty="0"/>
+          </a:p>
+        </p:txBody>
+      </p:sp>
+      <p:pic>
+        <p:nvPicPr>
+          <p:cNvPr id="5" name="Picture 4">
+            <a:extLst>
+              <a:ext uri="{FF2B5EF4-FFF2-40B4-BE49-F238E27FC236}">
+                <a16:creationId xmlns:a16="http://schemas.microsoft.com/office/drawing/2014/main" id="{4D47AB79-B47E-354D-B2C3-DD85E40E1FBD}"/>
+              </a:ext>
+            </a:extLst>
+          </p:cNvPr>
+          <p:cNvPicPr>
+            <a:picLocks noChangeAspect="1"/>
+          </p:cNvPicPr>
+          <p:nvPr/>
+        </p:nvPicPr>
+        <p:blipFill>
+          <a:blip r:embed="rId2"/>
+          <a:stretch>
+            <a:fillRect/>
+          </a:stretch>
+        </p:blipFill>
+        <p:spPr>
+          <a:xfrm>
+            <a:off x="147102" y="2207151"/>
+            <a:ext cx="6266669" cy="3002158"/>
+          </a:xfrm>
+          <a:prstGeom prst="rect">
+            <a:avLst/>
+          </a:prstGeom>
+        </p:spPr>
+      </p:pic>
     </p:spTree>
     <p:extLst>
       <p:ext uri="{BB962C8B-B14F-4D97-AF65-F5344CB8AC3E}">
-        <p14:creationId xmlns:p14="http://schemas.microsoft.com/office/powerpoint/2010/main" val="1277288948"/>
+        <p14:creationId xmlns:p14="http://schemas.microsoft.com/office/powerpoint/2010/main" val="1590656834"/>
       </p:ext>
     </p:extLst>
   </p:cSld>
@@ -4351,10 +4741,144 @@
           <a:chExt cx="0" cy="0"/>
         </a:xfrm>
       </p:grpSpPr>
+      <p:sp>
+        <p:nvSpPr>
+          <p:cNvPr id="2" name="Title 1">
+            <a:extLst>
+              <a:ext uri="{FF2B5EF4-FFF2-40B4-BE49-F238E27FC236}">
+                <a16:creationId xmlns:a16="http://schemas.microsoft.com/office/drawing/2014/main" id="{91AC6E37-E50E-7447-8EF1-72790B441D83}"/>
+              </a:ext>
+            </a:extLst>
+          </p:cNvPr>
+          <p:cNvSpPr>
+            <a:spLocks noGrp="1"/>
+          </p:cNvSpPr>
+          <p:nvPr>
+            <p:ph type="title"/>
+          </p:nvPr>
+        </p:nvSpPr>
+        <p:spPr/>
+        <p:txBody>
+          <a:bodyPr/>
+          <a:lstStyle/>
+          <a:p>
+            <a:r>
+              <a:rPr lang="en-US" dirty="0"/>
+              <a:t>Sample Code: </a:t>
+            </a:r>
+            <a:br>
+              <a:rPr lang="en-US" dirty="0"/>
+            </a:br>
+            <a:r>
+              <a:rPr lang="en-US" dirty="0"/>
+              <a:t>Check For Duplicate Username</a:t>
+            </a:r>
+          </a:p>
+        </p:txBody>
+      </p:sp>
+      <p:sp>
+        <p:nvSpPr>
+          <p:cNvPr id="4" name="Content Placeholder 3">
+            <a:extLst>
+              <a:ext uri="{FF2B5EF4-FFF2-40B4-BE49-F238E27FC236}">
+                <a16:creationId xmlns:a16="http://schemas.microsoft.com/office/drawing/2014/main" id="{EFF43386-633B-BE4E-9503-18B0D7E6F1AD}"/>
+              </a:ext>
+            </a:extLst>
+          </p:cNvPr>
+          <p:cNvSpPr>
+            <a:spLocks noGrp="1"/>
+          </p:cNvSpPr>
+          <p:nvPr>
+            <p:ph sz="half" idx="2"/>
+          </p:nvPr>
+        </p:nvSpPr>
+        <p:spPr>
+          <a:xfrm>
+            <a:off x="6413770" y="2017343"/>
+            <a:ext cx="4822265" cy="3441520"/>
+          </a:xfrm>
+        </p:spPr>
+        <p:txBody>
+          <a:bodyPr/>
+          <a:lstStyle/>
+          <a:p>
+            <a:r>
+              <a:rPr lang="en-US" dirty="0"/>
+              <a:t>Context: in </a:t>
+            </a:r>
+            <a:r>
+              <a:rPr lang="en-US" dirty="0" err="1"/>
+              <a:t>UserServlet</a:t>
+            </a:r>
+            <a:r>
+              <a:rPr lang="en-US" dirty="0"/>
+              <a:t> </a:t>
+            </a:r>
+            <a:r>
+              <a:rPr lang="en-US" dirty="0" err="1"/>
+              <a:t>doPost</a:t>
+            </a:r>
+            <a:r>
+              <a:rPr lang="en-US" dirty="0"/>
+              <a:t>() method</a:t>
+            </a:r>
+          </a:p>
+          <a:p>
+            <a:r>
+              <a:rPr lang="en-US" dirty="0"/>
+              <a:t>Grab all users </a:t>
+            </a:r>
+          </a:p>
+          <a:p>
+            <a:r>
+              <a:rPr lang="en-US" dirty="0"/>
+              <a:t>If username of </a:t>
+            </a:r>
+            <a:r>
+              <a:rPr lang="en-US" dirty="0" err="1"/>
+              <a:t>newUser</a:t>
+            </a:r>
+            <a:r>
+              <a:rPr lang="en-US" dirty="0"/>
+              <a:t> matches that of an existing user, send a client-side error in the response</a:t>
+            </a:r>
+          </a:p>
+        </p:txBody>
+      </p:sp>
+      <p:pic>
+        <p:nvPicPr>
+          <p:cNvPr id="10" name="Picture 9">
+            <a:extLst>
+              <a:ext uri="{FF2B5EF4-FFF2-40B4-BE49-F238E27FC236}">
+                <a16:creationId xmlns:a16="http://schemas.microsoft.com/office/drawing/2014/main" id="{796C1251-288C-C640-A152-5E715947C26C}"/>
+              </a:ext>
+            </a:extLst>
+          </p:cNvPr>
+          <p:cNvPicPr>
+            <a:picLocks noChangeAspect="1"/>
+          </p:cNvPicPr>
+          <p:nvPr/>
+        </p:nvPicPr>
+        <p:blipFill>
+          <a:blip r:embed="rId2"/>
+          <a:stretch>
+            <a:fillRect/>
+          </a:stretch>
+        </p:blipFill>
+        <p:spPr>
+          <a:xfrm>
+            <a:off x="132466" y="2017343"/>
+            <a:ext cx="6281305" cy="2790184"/>
+          </a:xfrm>
+          <a:prstGeom prst="rect">
+            <a:avLst/>
+          </a:prstGeom>
+        </p:spPr>
+      </p:pic>
     </p:spTree>
     <p:extLst>
       <p:ext uri="{BB962C8B-B14F-4D97-AF65-F5344CB8AC3E}">
-        <p14:creationId xmlns:p14="http://schemas.microsoft.com/office/powerpoint/2010/main" val="191101199"/>
+        <p14:creationId xmlns:p14="http://schemas.microsoft.com/office/powerpoint/2010/main" val="952462568"/>
       </p:ext>
     </p:extLst>
   </p:cSld>
@@ -4386,7 +4910,7 @@
           <p:cNvPr id="2" name="Title 1">
             <a:extLst>
               <a:ext uri="{FF2B5EF4-FFF2-40B4-BE49-F238E27FC236}">
-                <a16:creationId xmlns:a16="http://schemas.microsoft.com/office/drawing/2014/main" id="{D8BC650F-C586-7044-AD83-FB91A768494F}"/>
+                <a16:creationId xmlns:a16="http://schemas.microsoft.com/office/drawing/2014/main" id="{91AC6E37-E50E-7447-8EF1-72790B441D83}"/>
               </a:ext>
             </a:extLst>
           </p:cNvPr>
@@ -4394,54 +4918,34 @@
             <a:spLocks noGrp="1"/>
           </p:cNvSpPr>
           <p:nvPr>
-            <p:ph type="ctrTitle"/>
-          </p:nvPr>
-        </p:nvSpPr>
-        <p:spPr>
-          <a:xfrm>
-            <a:off x="2417779" y="802298"/>
-            <a:ext cx="8637073" cy="2541431"/>
-          </a:xfrm>
-        </p:spPr>
-        <p:txBody>
-          <a:bodyPr>
-            <a:normAutofit fontScale="90000"/>
-          </a:bodyPr>
-          <a:lstStyle/>
-          <a:p>
-            <a:r>
-              <a:rPr lang="en-US" sz="3200" dirty="0"/>
-              <a:t>Thank you for your time!</a:t>
+            <p:ph type="title"/>
+          </p:nvPr>
+        </p:nvSpPr>
+        <p:spPr/>
+        <p:txBody>
+          <a:bodyPr/>
+          <a:lstStyle/>
+          <a:p>
+            <a:r>
+              <a:rPr lang="en-US" dirty="0"/>
+              <a:t>Sample Code: </a:t>
             </a:r>
             <a:br>
-              <a:rPr lang="en-US" sz="3200" dirty="0"/>
+              <a:rPr lang="en-US" dirty="0"/>
             </a:br>
             <a:r>
-              <a:rPr lang="en-US" sz="3200" dirty="0"/>
-              <a:t>Any Questions?</a:t>
-            </a:r>
-            <a:br>
-              <a:rPr lang="en-US" sz="3200" dirty="0"/>
-            </a:br>
-            <a:br>
-              <a:rPr lang="en-US" sz="4000" dirty="0"/>
-            </a:br>
-            <a:br>
-              <a:rPr lang="en-US" sz="4000" dirty="0"/>
-            </a:br>
-            <a:r>
-              <a:rPr lang="en-US" sz="6000" dirty="0"/>
-              <a:t>AGILERS</a:t>
-            </a:r>
-          </a:p>
-        </p:txBody>
-      </p:sp>
-      <p:sp>
-        <p:nvSpPr>
-          <p:cNvPr id="3" name="Subtitle 2">
+              <a:rPr lang="en-US" dirty="0"/>
+              <a:t>Check For Duplicate Username</a:t>
+            </a:r>
+          </a:p>
+        </p:txBody>
+      </p:sp>
+      <p:sp>
+        <p:nvSpPr>
+          <p:cNvPr id="4" name="Content Placeholder 3">
             <a:extLst>
               <a:ext uri="{FF2B5EF4-FFF2-40B4-BE49-F238E27FC236}">
-                <a16:creationId xmlns:a16="http://schemas.microsoft.com/office/drawing/2014/main" id="{D0313645-FE71-914D-8C3B-4B493021A538}"/>
+                <a16:creationId xmlns:a16="http://schemas.microsoft.com/office/drawing/2014/main" id="{EFF43386-633B-BE4E-9503-18B0D7E6F1AD}"/>
               </a:ext>
             </a:extLst>
           </p:cNvPr>
@@ -4449,38 +4953,279 @@
             <a:spLocks noGrp="1"/>
           </p:cNvSpPr>
           <p:nvPr>
-            <p:ph type="subTitle" idx="1"/>
-          </p:nvPr>
-        </p:nvSpPr>
-        <p:spPr>
-          <a:xfrm>
-            <a:off x="2417780" y="3531203"/>
-            <a:ext cx="8637072" cy="1723969"/>
-          </a:xfrm>
-        </p:spPr>
-        <p:txBody>
-          <a:bodyPr>
-            <a:normAutofit fontScale="62500" lnSpcReduction="20000"/>
-          </a:bodyPr>
-          <a:lstStyle/>
-          <a:p>
-            <a:endParaRPr lang="en-US" sz="7200" dirty="0"/>
-          </a:p>
-          <a:p>
+            <p:ph sz="half" idx="2"/>
+          </p:nvPr>
+        </p:nvSpPr>
+        <p:spPr>
+          <a:xfrm>
+            <a:off x="6413771" y="2017343"/>
+            <a:ext cx="4645152" cy="4092512"/>
+          </a:xfrm>
+        </p:spPr>
+        <p:txBody>
+          <a:bodyPr/>
+          <a:lstStyle/>
+          <a:p>
+            <a:r>
+              <a:rPr lang="en-US" dirty="0"/>
+              <a:t>Context: DB table creation script</a:t>
+            </a:r>
+          </a:p>
+          <a:p>
+            <a:r>
+              <a:rPr lang="en-US" dirty="0"/>
+              <a:t>UNIQUE constraint on </a:t>
+            </a:r>
+            <a:r>
+              <a:rPr lang="en-US" dirty="0" err="1"/>
+              <a:t>ers_username</a:t>
+            </a:r>
             <a:endParaRPr lang="en-US" dirty="0"/>
           </a:p>
           <a:p>
-            <a:r>
-              <a:rPr lang="en-US" sz="3200" dirty="0"/>
-              <a:t>Engineered By Alex Johnson AND GABRIEL ZAPATA</a:t>
-            </a:r>
-          </a:p>
-        </p:txBody>
-      </p:sp>
+            <a:endParaRPr lang="en-US" dirty="0"/>
+          </a:p>
+          <a:p>
+            <a:endParaRPr lang="en-US" dirty="0"/>
+          </a:p>
+          <a:p>
+            <a:endParaRPr lang="en-US" dirty="0"/>
+          </a:p>
+          <a:p>
+            <a:r>
+              <a:rPr lang="en-US" dirty="0"/>
+              <a:t>Context: in add() method of </a:t>
+            </a:r>
+            <a:r>
+              <a:rPr lang="en-US" dirty="0" err="1"/>
+              <a:t>UserDAO</a:t>
+            </a:r>
+            <a:endParaRPr lang="en-US" dirty="0"/>
+          </a:p>
+          <a:p>
+            <a:r>
+              <a:rPr lang="en-US" dirty="0" err="1"/>
+              <a:t>newUser</a:t>
+            </a:r>
+            <a:r>
+              <a:rPr lang="en-US" dirty="0"/>
+              <a:t> will not be persisted to DB because </a:t>
+            </a:r>
+            <a:r>
+              <a:rPr lang="en-US" dirty="0" err="1"/>
+              <a:t>sicve</a:t>
+            </a:r>
+            <a:r>
+              <a:rPr lang="en-US" dirty="0"/>
+              <a:t> is thrown</a:t>
+            </a:r>
+          </a:p>
+          <a:p>
+            <a:endParaRPr lang="en-US" dirty="0"/>
+          </a:p>
+        </p:txBody>
+      </p:sp>
+      <p:pic>
+        <p:nvPicPr>
+          <p:cNvPr id="6" name="Picture 5">
+            <a:extLst>
+              <a:ext uri="{FF2B5EF4-FFF2-40B4-BE49-F238E27FC236}">
+                <a16:creationId xmlns:a16="http://schemas.microsoft.com/office/drawing/2014/main" id="{0A7283D8-12FD-5C4C-A192-8BDE74D5538F}"/>
+              </a:ext>
+            </a:extLst>
+          </p:cNvPr>
+          <p:cNvPicPr>
+            <a:picLocks noChangeAspect="1"/>
+          </p:cNvPicPr>
+          <p:nvPr/>
+        </p:nvPicPr>
+        <p:blipFill>
+          <a:blip r:embed="rId2"/>
+          <a:stretch>
+            <a:fillRect/>
+          </a:stretch>
+        </p:blipFill>
+        <p:spPr>
+          <a:xfrm>
+            <a:off x="146050" y="2207150"/>
+            <a:ext cx="6267721" cy="1963817"/>
+          </a:xfrm>
+          <a:prstGeom prst="rect">
+            <a:avLst/>
+          </a:prstGeom>
+        </p:spPr>
+      </p:pic>
+      <p:pic>
+        <p:nvPicPr>
+          <p:cNvPr id="8" name="Picture 7">
+            <a:extLst>
+              <a:ext uri="{FF2B5EF4-FFF2-40B4-BE49-F238E27FC236}">
+                <a16:creationId xmlns:a16="http://schemas.microsoft.com/office/drawing/2014/main" id="{F62BFCDC-FF76-9846-B5A2-E73D274ABB88}"/>
+              </a:ext>
+            </a:extLst>
+          </p:cNvPr>
+          <p:cNvPicPr>
+            <a:picLocks noChangeAspect="1"/>
+          </p:cNvPicPr>
+          <p:nvPr/>
+        </p:nvPicPr>
+        <p:blipFill>
+          <a:blip r:embed="rId3"/>
+          <a:stretch>
+            <a:fillRect/>
+          </a:stretch>
+        </p:blipFill>
+        <p:spPr>
+          <a:xfrm>
+            <a:off x="146050" y="4324117"/>
+            <a:ext cx="6267721" cy="1785738"/>
+          </a:xfrm>
+          <a:prstGeom prst="rect">
+            <a:avLst/>
+          </a:prstGeom>
+        </p:spPr>
+      </p:pic>
     </p:spTree>
     <p:extLst>
       <p:ext uri="{BB962C8B-B14F-4D97-AF65-F5344CB8AC3E}">
-        <p14:creationId xmlns:p14="http://schemas.microsoft.com/office/powerpoint/2010/main" val="86170640"/>
+        <p14:creationId xmlns:p14="http://schemas.microsoft.com/office/powerpoint/2010/main" val="1612275083"/>
+      </p:ext>
+    </p:extLst>
+  </p:cSld>
+  <p:clrMapOvr>
+    <a:masterClrMapping/>
+  </p:clrMapOvr>
+</p:sld>
+</file>
+
+<file path=ppt/slides/slide9.xml><?xml version="1.0" encoding="utf-8"?>
+<p:sld xmlns:a="http://schemas.openxmlformats.org/drawingml/2006/main" xmlns:r="http://schemas.openxmlformats.org/officeDocument/2006/relationships" xmlns:p="http://schemas.openxmlformats.org/presentationml/2006/main">
+  <p:cSld>
+    <p:spTree>
+      <p:nvGrpSpPr>
+        <p:cNvPr id="1" name=""/>
+        <p:cNvGrpSpPr/>
+        <p:nvPr/>
+      </p:nvGrpSpPr>
+      <p:grpSpPr>
+        <a:xfrm>
+          <a:off x="0" y="0"/>
+          <a:ext cx="0" cy="0"/>
+          <a:chOff x="0" y="0"/>
+          <a:chExt cx="0" cy="0"/>
+        </a:xfrm>
+      </p:grpSpPr>
+      <p:sp>
+        <p:nvSpPr>
+          <p:cNvPr id="2" name="Title 1">
+            <a:extLst>
+              <a:ext uri="{FF2B5EF4-FFF2-40B4-BE49-F238E27FC236}">
+                <a16:creationId xmlns:a16="http://schemas.microsoft.com/office/drawing/2014/main" id="{91AC6E37-E50E-7447-8EF1-72790B441D83}"/>
+              </a:ext>
+            </a:extLst>
+          </p:cNvPr>
+          <p:cNvSpPr>
+            <a:spLocks noGrp="1"/>
+          </p:cNvSpPr>
+          <p:nvPr>
+            <p:ph type="title"/>
+          </p:nvPr>
+        </p:nvSpPr>
+        <p:spPr/>
+        <p:txBody>
+          <a:bodyPr/>
+          <a:lstStyle/>
+          <a:p>
+            <a:r>
+              <a:rPr lang="en-US" dirty="0"/>
+              <a:t>Sample Code: </a:t>
+            </a:r>
+            <a:br>
+              <a:rPr lang="en-US" dirty="0"/>
+            </a:br>
+            <a:r>
+              <a:rPr lang="en-US" dirty="0"/>
+              <a:t>Check For Duplicate Username</a:t>
+            </a:r>
+          </a:p>
+        </p:txBody>
+      </p:sp>
+      <p:sp>
+        <p:nvSpPr>
+          <p:cNvPr id="4" name="Content Placeholder 3">
+            <a:extLst>
+              <a:ext uri="{FF2B5EF4-FFF2-40B4-BE49-F238E27FC236}">
+                <a16:creationId xmlns:a16="http://schemas.microsoft.com/office/drawing/2014/main" id="{EFF43386-633B-BE4E-9503-18B0D7E6F1AD}"/>
+              </a:ext>
+            </a:extLst>
+          </p:cNvPr>
+          <p:cNvSpPr>
+            <a:spLocks noGrp="1"/>
+          </p:cNvSpPr>
+          <p:nvPr>
+            <p:ph sz="half" idx="2"/>
+          </p:nvPr>
+        </p:nvSpPr>
+        <p:spPr/>
+        <p:txBody>
+          <a:bodyPr/>
+          <a:lstStyle/>
+          <a:p>
+            <a:r>
+              <a:rPr lang="en-US" dirty="0"/>
+              <a:t>Context: in </a:t>
+            </a:r>
+            <a:r>
+              <a:rPr lang="en-US" dirty="0" err="1"/>
+              <a:t>async</a:t>
+            </a:r>
+            <a:r>
+              <a:rPr lang="en-US" dirty="0"/>
+              <a:t> function register()</a:t>
+            </a:r>
+          </a:p>
+          <a:p>
+            <a:r>
+              <a:rPr lang="en-US" dirty="0"/>
+              <a:t>If the user receives the client-side error in question, display an alert message</a:t>
+            </a:r>
+          </a:p>
+        </p:txBody>
+      </p:sp>
+      <p:pic>
+        <p:nvPicPr>
+          <p:cNvPr id="5" name="Picture 4">
+            <a:extLst>
+              <a:ext uri="{FF2B5EF4-FFF2-40B4-BE49-F238E27FC236}">
+                <a16:creationId xmlns:a16="http://schemas.microsoft.com/office/drawing/2014/main" id="{D3F4E908-4DF3-1547-BAE6-A7A4062667C0}"/>
+              </a:ext>
+            </a:extLst>
+          </p:cNvPr>
+          <p:cNvPicPr>
+            <a:picLocks noChangeAspect="1"/>
+          </p:cNvPicPr>
+          <p:nvPr/>
+        </p:nvPicPr>
+        <p:blipFill>
+          <a:blip r:embed="rId2"/>
+          <a:stretch>
+            <a:fillRect/>
+          </a:stretch>
+        </p:blipFill>
+        <p:spPr>
+          <a:xfrm>
+            <a:off x="118508" y="2017342"/>
+            <a:ext cx="6295262" cy="2152875"/>
+          </a:xfrm>
+          <a:prstGeom prst="rect">
+            <a:avLst/>
+          </a:prstGeom>
+        </p:spPr>
+      </p:pic>
+    </p:spTree>
+    <p:extLst>
+      <p:ext uri="{BB962C8B-B14F-4D97-AF65-F5344CB8AC3E}">
+        <p14:creationId xmlns:p14="http://schemas.microsoft.com/office/powerpoint/2010/main" val="2725296051"/>
       </p:ext>
     </p:extLst>
   </p:cSld>

</xml_diff>